<commit_message>
First full editing pass through the guide incl. parameter descrips
</commit_message>
<xml_diff>
--- a/docs/images/Okta ASA architecture diagram.pptx
+++ b/docs/images/Okta ASA architecture diagram.pptx
@@ -243,7 +243,7 @@
           <a:p>
             <a:fld id="{F5BBEAF3-B822-4630-9CB4-8DAFAEF08468}" type="datetimeFigureOut">
               <a:rPr lang="en-US" smtClean="0"/>
-              <a:t>3/19/2021</a:t>
+              <a:t>3/26/2021</a:t>
             </a:fld>
             <a:endParaRPr lang="en-US"/>
           </a:p>
@@ -413,7 +413,7 @@
           <a:p>
             <a:fld id="{F5BBEAF3-B822-4630-9CB4-8DAFAEF08468}" type="datetimeFigureOut">
               <a:rPr lang="en-US" smtClean="0"/>
-              <a:t>3/19/2021</a:t>
+              <a:t>3/26/2021</a:t>
             </a:fld>
             <a:endParaRPr lang="en-US"/>
           </a:p>
@@ -593,7 +593,7 @@
           <a:p>
             <a:fld id="{F5BBEAF3-B822-4630-9CB4-8DAFAEF08468}" type="datetimeFigureOut">
               <a:rPr lang="en-US" smtClean="0"/>
-              <a:t>3/19/2021</a:t>
+              <a:t>3/26/2021</a:t>
             </a:fld>
             <a:endParaRPr lang="en-US"/>
           </a:p>
@@ -763,7 +763,7 @@
           <a:p>
             <a:fld id="{F5BBEAF3-B822-4630-9CB4-8DAFAEF08468}" type="datetimeFigureOut">
               <a:rPr lang="en-US" smtClean="0"/>
-              <a:t>3/19/2021</a:t>
+              <a:t>3/26/2021</a:t>
             </a:fld>
             <a:endParaRPr lang="en-US"/>
           </a:p>
@@ -1009,7 +1009,7 @@
           <a:p>
             <a:fld id="{F5BBEAF3-B822-4630-9CB4-8DAFAEF08468}" type="datetimeFigureOut">
               <a:rPr lang="en-US" smtClean="0"/>
-              <a:t>3/19/2021</a:t>
+              <a:t>3/26/2021</a:t>
             </a:fld>
             <a:endParaRPr lang="en-US"/>
           </a:p>
@@ -1241,7 +1241,7 @@
           <a:p>
             <a:fld id="{F5BBEAF3-B822-4630-9CB4-8DAFAEF08468}" type="datetimeFigureOut">
               <a:rPr lang="en-US" smtClean="0"/>
-              <a:t>3/19/2021</a:t>
+              <a:t>3/26/2021</a:t>
             </a:fld>
             <a:endParaRPr lang="en-US"/>
           </a:p>
@@ -1608,7 +1608,7 @@
           <a:p>
             <a:fld id="{F5BBEAF3-B822-4630-9CB4-8DAFAEF08468}" type="datetimeFigureOut">
               <a:rPr lang="en-US" smtClean="0"/>
-              <a:t>3/19/2021</a:t>
+              <a:t>3/26/2021</a:t>
             </a:fld>
             <a:endParaRPr lang="en-US"/>
           </a:p>
@@ -1726,7 +1726,7 @@
           <a:p>
             <a:fld id="{F5BBEAF3-B822-4630-9CB4-8DAFAEF08468}" type="datetimeFigureOut">
               <a:rPr lang="en-US" smtClean="0"/>
-              <a:t>3/19/2021</a:t>
+              <a:t>3/26/2021</a:t>
             </a:fld>
             <a:endParaRPr lang="en-US"/>
           </a:p>
@@ -1821,7 +1821,7 @@
           <a:p>
             <a:fld id="{F5BBEAF3-B822-4630-9CB4-8DAFAEF08468}" type="datetimeFigureOut">
               <a:rPr lang="en-US" smtClean="0"/>
-              <a:t>3/19/2021</a:t>
+              <a:t>3/26/2021</a:t>
             </a:fld>
             <a:endParaRPr lang="en-US"/>
           </a:p>
@@ -2098,7 +2098,7 @@
           <a:p>
             <a:fld id="{F5BBEAF3-B822-4630-9CB4-8DAFAEF08468}" type="datetimeFigureOut">
               <a:rPr lang="en-US" smtClean="0"/>
-              <a:t>3/19/2021</a:t>
+              <a:t>3/26/2021</a:t>
             </a:fld>
             <a:endParaRPr lang="en-US"/>
           </a:p>
@@ -2351,7 +2351,7 @@
           <a:p>
             <a:fld id="{F5BBEAF3-B822-4630-9CB4-8DAFAEF08468}" type="datetimeFigureOut">
               <a:rPr lang="en-US" smtClean="0"/>
-              <a:t>3/19/2021</a:t>
+              <a:t>3/26/2021</a:t>
             </a:fld>
             <a:endParaRPr lang="en-US"/>
           </a:p>
@@ -2564,7 +2564,7 @@
           <a:p>
             <a:fld id="{F5BBEAF3-B822-4630-9CB4-8DAFAEF08468}" type="datetimeFigureOut">
               <a:rPr lang="en-US" smtClean="0"/>
-              <a:t>3/19/2021</a:t>
+              <a:t>3/26/2021</a:t>
             </a:fld>
             <a:endParaRPr lang="en-US"/>
           </a:p>
@@ -3342,7 +3342,7 @@
           <a:blip r:embed="rId2">
             <a:extLst>
               <a:ext uri="{96DAC541-7B7A-43D3-8B79-37D633B846F1}">
-                <asvg:svgBlip xmlns:asvg="http://schemas.microsoft.com/office/drawing/2016/SVG/main" xmlns="" r:embed="rId3"/>
+                <asvg:svgBlip xmlns="" xmlns:asvg="http://schemas.microsoft.com/office/drawing/2016/SVG/main" r:embed="rId3"/>
               </a:ext>
             </a:extLst>
           </a:blip>
@@ -3378,7 +3378,7 @@
           <a:blip r:embed="rId4">
             <a:extLst>
               <a:ext uri="{96DAC541-7B7A-43D3-8B79-37D633B846F1}">
-                <asvg:svgBlip xmlns:asvg="http://schemas.microsoft.com/office/drawing/2016/SVG/main" xmlns="" r:embed="rId5"/>
+                <asvg:svgBlip xmlns="" xmlns:asvg="http://schemas.microsoft.com/office/drawing/2016/SVG/main" r:embed="rId5"/>
               </a:ext>
             </a:extLst>
           </a:blip>
@@ -3414,7 +3414,7 @@
           <a:blip r:embed="rId6">
             <a:extLst>
               <a:ext uri="{96DAC541-7B7A-43D3-8B79-37D633B846F1}">
-                <asvg:svgBlip xmlns:asvg="http://schemas.microsoft.com/office/drawing/2016/SVG/main" xmlns="" r:embed="rId7"/>
+                <asvg:svgBlip xmlns="" xmlns:asvg="http://schemas.microsoft.com/office/drawing/2016/SVG/main" r:embed="rId7"/>
               </a:ext>
             </a:extLst>
           </a:blip>
@@ -3450,7 +3450,7 @@
           <a:blip r:embed="rId8">
             <a:extLst>
               <a:ext uri="{96DAC541-7B7A-43D3-8B79-37D633B846F1}">
-                <asvg:svgBlip xmlns:asvg="http://schemas.microsoft.com/office/drawing/2016/SVG/main" xmlns="" r:embed="rId9"/>
+                <asvg:svgBlip xmlns="" xmlns:asvg="http://schemas.microsoft.com/office/drawing/2016/SVG/main" r:embed="rId9"/>
               </a:ext>
             </a:extLst>
           </a:blip>
@@ -3576,7 +3576,7 @@
           <a:blip r:embed="rId10">
             <a:extLst>
               <a:ext uri="{96DAC541-7B7A-43D3-8B79-37D633B846F1}">
-                <asvg:svgBlip xmlns:asvg="http://schemas.microsoft.com/office/drawing/2016/SVG/main" xmlns="" r:embed="rId11"/>
+                <asvg:svgBlip xmlns="" xmlns:asvg="http://schemas.microsoft.com/office/drawing/2016/SVG/main" r:embed="rId11"/>
               </a:ext>
             </a:extLst>
           </a:blip>
@@ -3612,7 +3612,7 @@
           <a:blip r:embed="rId12">
             <a:extLst>
               <a:ext uri="{96DAC541-7B7A-43D3-8B79-37D633B846F1}">
-                <asvg:svgBlip xmlns:asvg="http://schemas.microsoft.com/office/drawing/2016/SVG/main" xmlns="" r:embed="rId13"/>
+                <asvg:svgBlip xmlns="" xmlns:asvg="http://schemas.microsoft.com/office/drawing/2016/SVG/main" r:embed="rId13"/>
               </a:ext>
             </a:extLst>
           </a:blip>
@@ -3622,7 +3622,7 @@
         </p:blipFill>
         <p:spPr>
           <a:xfrm>
-            <a:off x="3269735" y="2399608"/>
+            <a:off x="3275083" y="2399608"/>
             <a:ext cx="469900" cy="469900"/>
           </a:xfrm>
           <a:prstGeom prst="rect">
@@ -3644,7 +3644,7 @@
         </p:nvSpPr>
         <p:spPr>
           <a:xfrm>
-            <a:off x="2748033" y="2845017"/>
+            <a:off x="2753381" y="2845017"/>
             <a:ext cx="1513305" cy="276999"/>
           </a:xfrm>
           <a:prstGeom prst="rect">
@@ -3660,7 +3660,7 @@
           <a:p>
             <a:pPr algn="ctr"/>
             <a:r>
-              <a:rPr lang="en-US" sz="1200" smtClean="0">
+              <a:rPr lang="en-US" sz="1200" dirty="0" smtClean="0">
                 <a:latin typeface="Arial" panose="020B0604020202020204" pitchFamily="34" charset="0"/>
                 <a:ea typeface="Amazon Ember" panose="020B0603020204020204" pitchFamily="34" charset="0"/>
                 <a:cs typeface="Arial" panose="020B0604020202020204" pitchFamily="34" charset="0"/>
@@ -3733,7 +3733,7 @@
           <a:blip r:embed="rId14">
             <a:extLst>
               <a:ext uri="{96DAC541-7B7A-43D3-8B79-37D633B846F1}">
-                <asvg:svgBlip xmlns:asvg="http://schemas.microsoft.com/office/drawing/2016/SVG/main" xmlns="" r:embed="rId17"/>
+                <asvg:svgBlip xmlns="" xmlns:asvg="http://schemas.microsoft.com/office/drawing/2016/SVG/main" r:embed="rId17"/>
               </a:ext>
             </a:extLst>
           </a:blip>
@@ -3769,7 +3769,7 @@
           <a:blip r:embed="rId6">
             <a:extLst>
               <a:ext uri="{96DAC541-7B7A-43D3-8B79-37D633B846F1}">
-                <asvg:svgBlip xmlns:asvg="http://schemas.microsoft.com/office/drawing/2016/SVG/main" xmlns="" r:embed="rId7"/>
+                <asvg:svgBlip xmlns="" xmlns:asvg="http://schemas.microsoft.com/office/drawing/2016/SVG/main" r:embed="rId7"/>
               </a:ext>
             </a:extLst>
           </a:blip>
@@ -3805,7 +3805,7 @@
           <a:blip r:embed="rId8">
             <a:extLst>
               <a:ext uri="{96DAC541-7B7A-43D3-8B79-37D633B846F1}">
-                <asvg:svgBlip xmlns:asvg="http://schemas.microsoft.com/office/drawing/2016/SVG/main" xmlns="" r:embed="rId9"/>
+                <asvg:svgBlip xmlns="" xmlns:asvg="http://schemas.microsoft.com/office/drawing/2016/SVG/main" r:embed="rId9"/>
               </a:ext>
             </a:extLst>
           </a:blip>
@@ -3837,7 +3837,7 @@
         </p:nvSpPr>
         <p:spPr>
           <a:xfrm>
-            <a:off x="5995478" y="2821571"/>
+            <a:off x="6000826" y="2845017"/>
             <a:ext cx="1513305" cy="276999"/>
           </a:xfrm>
           <a:prstGeom prst="rect">
@@ -3950,7 +3950,7 @@
           <a:blip r:embed="rId14">
             <a:extLst>
               <a:ext uri="{96DAC541-7B7A-43D3-8B79-37D633B846F1}">
-                <asvg:svgBlip xmlns:asvg="http://schemas.microsoft.com/office/drawing/2016/SVG/main" xmlns="" r:embed="rId17"/>
+                <asvg:svgBlip xmlns="" xmlns:asvg="http://schemas.microsoft.com/office/drawing/2016/SVG/main" r:embed="rId17"/>
               </a:ext>
             </a:extLst>
           </a:blip>
@@ -3995,7 +3995,7 @@
                 </a14:imgProps>
               </a:ext>
               <a:ext uri="{96DAC541-7B7A-43D3-8B79-37D633B846F1}">
-                <asvg:svgBlip xmlns:asvg="http://schemas.microsoft.com/office/drawing/2016/SVG/main" xmlns="" r:embed="rId32"/>
+                <asvg:svgBlip xmlns="" xmlns:asvg="http://schemas.microsoft.com/office/drawing/2016/SVG/main" r:embed="rId32"/>
               </a:ext>
             </a:extLst>
           </a:blip>
@@ -4005,7 +4005,7 @@
         </p:blipFill>
         <p:spPr>
           <a:xfrm>
-            <a:off x="6516178" y="2399608"/>
+            <a:off x="6522528" y="2399608"/>
             <a:ext cx="469900" cy="469900"/>
           </a:xfrm>
           <a:prstGeom prst="rect">
@@ -4121,7 +4121,7 @@
           <a:blip r:embed="rId10">
             <a:extLst>
               <a:ext uri="{96DAC541-7B7A-43D3-8B79-37D633B846F1}">
-                <asvg:svgBlip xmlns:asvg="http://schemas.microsoft.com/office/drawing/2016/SVG/main" xmlns="" r:embed="rId11"/>
+                <asvg:svgBlip xmlns="" xmlns:asvg="http://schemas.microsoft.com/office/drawing/2016/SVG/main" r:embed="rId11"/>
               </a:ext>
             </a:extLst>
           </a:blip>
@@ -4157,7 +4157,7 @@
           <a:blip r:embed="rId12">
             <a:extLst>
               <a:ext uri="{96DAC541-7B7A-43D3-8B79-37D633B846F1}">
-                <asvg:svgBlip xmlns:asvg="http://schemas.microsoft.com/office/drawing/2016/SVG/main" xmlns="" r:embed="rId13"/>
+                <asvg:svgBlip xmlns="" xmlns:asvg="http://schemas.microsoft.com/office/drawing/2016/SVG/main" r:embed="rId13"/>
               </a:ext>
             </a:extLst>
           </a:blip>
@@ -4167,7 +4167,7 @@
         </p:blipFill>
         <p:spPr>
           <a:xfrm>
-            <a:off x="3280430" y="4076008"/>
+            <a:off x="3275083" y="4076008"/>
             <a:ext cx="469900" cy="469900"/>
           </a:xfrm>
           <a:prstGeom prst="rect">
@@ -4189,7 +4189,7 @@
         </p:nvSpPr>
         <p:spPr>
           <a:xfrm>
-            <a:off x="2758728" y="4521417"/>
+            <a:off x="2753381" y="4521417"/>
             <a:ext cx="1513305" cy="276999"/>
           </a:xfrm>
           <a:prstGeom prst="rect">
@@ -4205,7 +4205,7 @@
           <a:p>
             <a:pPr algn="ctr"/>
             <a:r>
-              <a:rPr lang="en-US" sz="1200" smtClean="0">
+              <a:rPr lang="en-US" sz="1200" dirty="0" smtClean="0">
                 <a:latin typeface="Arial" panose="020B0604020202020204" pitchFamily="34" charset="0"/>
                 <a:ea typeface="Amazon Ember" panose="020B0603020204020204" pitchFamily="34" charset="0"/>
                 <a:cs typeface="Arial" panose="020B0604020202020204" pitchFamily="34" charset="0"/>
@@ -4234,7 +4234,7 @@
         </p:nvSpPr>
         <p:spPr>
           <a:xfrm>
-            <a:off x="6006173" y="4497971"/>
+            <a:off x="6000826" y="4521417"/>
             <a:ext cx="1513305" cy="276999"/>
           </a:xfrm>
           <a:prstGeom prst="rect">
@@ -4295,7 +4295,7 @@
                 </a14:imgProps>
               </a:ext>
               <a:ext uri="{96DAC541-7B7A-43D3-8B79-37D633B846F1}">
-                <asvg:svgBlip xmlns:asvg="http://schemas.microsoft.com/office/drawing/2016/SVG/main" xmlns="" r:embed="rId32"/>
+                <asvg:svgBlip xmlns="" xmlns:asvg="http://schemas.microsoft.com/office/drawing/2016/SVG/main" r:embed="rId32"/>
               </a:ext>
             </a:extLst>
           </a:blip>
@@ -4305,7 +4305,7 @@
         </p:blipFill>
         <p:spPr>
           <a:xfrm>
-            <a:off x="6526873" y="4076008"/>
+            <a:off x="6522528" y="4076008"/>
             <a:ext cx="469900" cy="469900"/>
           </a:xfrm>
           <a:prstGeom prst="rect">
@@ -4330,7 +4330,7 @@
         <p:spPr>
           <a:xfrm>
             <a:off x="3504685" y="1978776"/>
-            <a:ext cx="0" cy="420832"/>
+            <a:ext cx="5348" cy="420832"/>
           </a:xfrm>
           <a:prstGeom prst="straightConnector1">
             <a:avLst/>

</xml_diff>

<commit_message>
Fixes per landing-page review
</commit_message>
<xml_diff>
--- a/docs/images/Okta ASA architecture diagram.pptx
+++ b/docs/images/Okta ASA architecture diagram.pptx
@@ -243,7 +243,7 @@
           <a:p>
             <a:fld id="{F5BBEAF3-B822-4630-9CB4-8DAFAEF08468}" type="datetimeFigureOut">
               <a:rPr lang="en-US" smtClean="0"/>
-              <a:t>3/26/2021</a:t>
+              <a:t>4/7/2021</a:t>
             </a:fld>
             <a:endParaRPr lang="en-US"/>
           </a:p>
@@ -413,7 +413,7 @@
           <a:p>
             <a:fld id="{F5BBEAF3-B822-4630-9CB4-8DAFAEF08468}" type="datetimeFigureOut">
               <a:rPr lang="en-US" smtClean="0"/>
-              <a:t>3/26/2021</a:t>
+              <a:t>4/7/2021</a:t>
             </a:fld>
             <a:endParaRPr lang="en-US"/>
           </a:p>
@@ -593,7 +593,7 @@
           <a:p>
             <a:fld id="{F5BBEAF3-B822-4630-9CB4-8DAFAEF08468}" type="datetimeFigureOut">
               <a:rPr lang="en-US" smtClean="0"/>
-              <a:t>3/26/2021</a:t>
+              <a:t>4/7/2021</a:t>
             </a:fld>
             <a:endParaRPr lang="en-US"/>
           </a:p>
@@ -763,7 +763,7 @@
           <a:p>
             <a:fld id="{F5BBEAF3-B822-4630-9CB4-8DAFAEF08468}" type="datetimeFigureOut">
               <a:rPr lang="en-US" smtClean="0"/>
-              <a:t>3/26/2021</a:t>
+              <a:t>4/7/2021</a:t>
             </a:fld>
             <a:endParaRPr lang="en-US"/>
           </a:p>
@@ -1009,7 +1009,7 @@
           <a:p>
             <a:fld id="{F5BBEAF3-B822-4630-9CB4-8DAFAEF08468}" type="datetimeFigureOut">
               <a:rPr lang="en-US" smtClean="0"/>
-              <a:t>3/26/2021</a:t>
+              <a:t>4/7/2021</a:t>
             </a:fld>
             <a:endParaRPr lang="en-US"/>
           </a:p>
@@ -1241,7 +1241,7 @@
           <a:p>
             <a:fld id="{F5BBEAF3-B822-4630-9CB4-8DAFAEF08468}" type="datetimeFigureOut">
               <a:rPr lang="en-US" smtClean="0"/>
-              <a:t>3/26/2021</a:t>
+              <a:t>4/7/2021</a:t>
             </a:fld>
             <a:endParaRPr lang="en-US"/>
           </a:p>
@@ -1608,7 +1608,7 @@
           <a:p>
             <a:fld id="{F5BBEAF3-B822-4630-9CB4-8DAFAEF08468}" type="datetimeFigureOut">
               <a:rPr lang="en-US" smtClean="0"/>
-              <a:t>3/26/2021</a:t>
+              <a:t>4/7/2021</a:t>
             </a:fld>
             <a:endParaRPr lang="en-US"/>
           </a:p>
@@ -1726,7 +1726,7 @@
           <a:p>
             <a:fld id="{F5BBEAF3-B822-4630-9CB4-8DAFAEF08468}" type="datetimeFigureOut">
               <a:rPr lang="en-US" smtClean="0"/>
-              <a:t>3/26/2021</a:t>
+              <a:t>4/7/2021</a:t>
             </a:fld>
             <a:endParaRPr lang="en-US"/>
           </a:p>
@@ -1821,7 +1821,7 @@
           <a:p>
             <a:fld id="{F5BBEAF3-B822-4630-9CB4-8DAFAEF08468}" type="datetimeFigureOut">
               <a:rPr lang="en-US" smtClean="0"/>
-              <a:t>3/26/2021</a:t>
+              <a:t>4/7/2021</a:t>
             </a:fld>
             <a:endParaRPr lang="en-US"/>
           </a:p>
@@ -2098,7 +2098,7 @@
           <a:p>
             <a:fld id="{F5BBEAF3-B822-4630-9CB4-8DAFAEF08468}" type="datetimeFigureOut">
               <a:rPr lang="en-US" smtClean="0"/>
-              <a:t>3/26/2021</a:t>
+              <a:t>4/7/2021</a:t>
             </a:fld>
             <a:endParaRPr lang="en-US"/>
           </a:p>
@@ -2351,7 +2351,7 @@
           <a:p>
             <a:fld id="{F5BBEAF3-B822-4630-9CB4-8DAFAEF08468}" type="datetimeFigureOut">
               <a:rPr lang="en-US" smtClean="0"/>
-              <a:t>3/26/2021</a:t>
+              <a:t>4/7/2021</a:t>
             </a:fld>
             <a:endParaRPr lang="en-US"/>
           </a:p>
@@ -2564,7 +2564,7 @@
           <a:p>
             <a:fld id="{F5BBEAF3-B822-4630-9CB4-8DAFAEF08468}" type="datetimeFigureOut">
               <a:rPr lang="en-US" smtClean="0"/>
-              <a:t>3/26/2021</a:t>
+              <a:t>4/7/2021</a:t>
             </a:fld>
             <a:endParaRPr lang="en-US"/>
           </a:p>
@@ -3342,7 +3342,7 @@
           <a:blip r:embed="rId2">
             <a:extLst>
               <a:ext uri="{96DAC541-7B7A-43D3-8B79-37D633B846F1}">
-                <asvg:svgBlip xmlns="" xmlns:asvg="http://schemas.microsoft.com/office/drawing/2016/SVG/main" r:embed="rId3"/>
+                <asvg:svgBlip xmlns:asvg="http://schemas.microsoft.com/office/drawing/2016/SVG/main" xmlns="" r:embed="rId3"/>
               </a:ext>
             </a:extLst>
           </a:blip>
@@ -3378,7 +3378,7 @@
           <a:blip r:embed="rId4">
             <a:extLst>
               <a:ext uri="{96DAC541-7B7A-43D3-8B79-37D633B846F1}">
-                <asvg:svgBlip xmlns="" xmlns:asvg="http://schemas.microsoft.com/office/drawing/2016/SVG/main" r:embed="rId5"/>
+                <asvg:svgBlip xmlns:asvg="http://schemas.microsoft.com/office/drawing/2016/SVG/main" xmlns="" r:embed="rId5"/>
               </a:ext>
             </a:extLst>
           </a:blip>
@@ -3414,7 +3414,7 @@
           <a:blip r:embed="rId6">
             <a:extLst>
               <a:ext uri="{96DAC541-7B7A-43D3-8B79-37D633B846F1}">
-                <asvg:svgBlip xmlns="" xmlns:asvg="http://schemas.microsoft.com/office/drawing/2016/SVG/main" r:embed="rId7"/>
+                <asvg:svgBlip xmlns:asvg="http://schemas.microsoft.com/office/drawing/2016/SVG/main" xmlns="" r:embed="rId7"/>
               </a:ext>
             </a:extLst>
           </a:blip>
@@ -3450,7 +3450,7 @@
           <a:blip r:embed="rId8">
             <a:extLst>
               <a:ext uri="{96DAC541-7B7A-43D3-8B79-37D633B846F1}">
-                <asvg:svgBlip xmlns="" xmlns:asvg="http://schemas.microsoft.com/office/drawing/2016/SVG/main" r:embed="rId9"/>
+                <asvg:svgBlip xmlns:asvg="http://schemas.microsoft.com/office/drawing/2016/SVG/main" xmlns="" r:embed="rId9"/>
               </a:ext>
             </a:extLst>
           </a:blip>
@@ -3576,7 +3576,7 @@
           <a:blip r:embed="rId10">
             <a:extLst>
               <a:ext uri="{96DAC541-7B7A-43D3-8B79-37D633B846F1}">
-                <asvg:svgBlip xmlns="" xmlns:asvg="http://schemas.microsoft.com/office/drawing/2016/SVG/main" r:embed="rId11"/>
+                <asvg:svgBlip xmlns:asvg="http://schemas.microsoft.com/office/drawing/2016/SVG/main" xmlns="" r:embed="rId11"/>
               </a:ext>
             </a:extLst>
           </a:blip>
@@ -3612,7 +3612,7 @@
           <a:blip r:embed="rId12">
             <a:extLst>
               <a:ext uri="{96DAC541-7B7A-43D3-8B79-37D633B846F1}">
-                <asvg:svgBlip xmlns="" xmlns:asvg="http://schemas.microsoft.com/office/drawing/2016/SVG/main" r:embed="rId13"/>
+                <asvg:svgBlip xmlns:asvg="http://schemas.microsoft.com/office/drawing/2016/SVG/main" xmlns="" r:embed="rId13"/>
               </a:ext>
             </a:extLst>
           </a:blip>
@@ -3733,7 +3733,7 @@
           <a:blip r:embed="rId14">
             <a:extLst>
               <a:ext uri="{96DAC541-7B7A-43D3-8B79-37D633B846F1}">
-                <asvg:svgBlip xmlns="" xmlns:asvg="http://schemas.microsoft.com/office/drawing/2016/SVG/main" r:embed="rId17"/>
+                <asvg:svgBlip xmlns:asvg="http://schemas.microsoft.com/office/drawing/2016/SVG/main" xmlns="" r:embed="rId17"/>
               </a:ext>
             </a:extLst>
           </a:blip>
@@ -3769,7 +3769,7 @@
           <a:blip r:embed="rId6">
             <a:extLst>
               <a:ext uri="{96DAC541-7B7A-43D3-8B79-37D633B846F1}">
-                <asvg:svgBlip xmlns="" xmlns:asvg="http://schemas.microsoft.com/office/drawing/2016/SVG/main" r:embed="rId7"/>
+                <asvg:svgBlip xmlns:asvg="http://schemas.microsoft.com/office/drawing/2016/SVG/main" xmlns="" r:embed="rId7"/>
               </a:ext>
             </a:extLst>
           </a:blip>
@@ -3805,7 +3805,7 @@
           <a:blip r:embed="rId8">
             <a:extLst>
               <a:ext uri="{96DAC541-7B7A-43D3-8B79-37D633B846F1}">
-                <asvg:svgBlip xmlns="" xmlns:asvg="http://schemas.microsoft.com/office/drawing/2016/SVG/main" r:embed="rId9"/>
+                <asvg:svgBlip xmlns:asvg="http://schemas.microsoft.com/office/drawing/2016/SVG/main" xmlns="" r:embed="rId9"/>
               </a:ext>
             </a:extLst>
           </a:blip>
@@ -3950,7 +3950,7 @@
           <a:blip r:embed="rId14">
             <a:extLst>
               <a:ext uri="{96DAC541-7B7A-43D3-8B79-37D633B846F1}">
-                <asvg:svgBlip xmlns="" xmlns:asvg="http://schemas.microsoft.com/office/drawing/2016/SVG/main" r:embed="rId17"/>
+                <asvg:svgBlip xmlns:asvg="http://schemas.microsoft.com/office/drawing/2016/SVG/main" xmlns="" r:embed="rId17"/>
               </a:ext>
             </a:extLst>
           </a:blip>
@@ -3995,7 +3995,7 @@
                 </a14:imgProps>
               </a:ext>
               <a:ext uri="{96DAC541-7B7A-43D3-8B79-37D633B846F1}">
-                <asvg:svgBlip xmlns="" xmlns:asvg="http://schemas.microsoft.com/office/drawing/2016/SVG/main" r:embed="rId32"/>
+                <asvg:svgBlip xmlns:asvg="http://schemas.microsoft.com/office/drawing/2016/SVG/main" xmlns="" r:embed="rId32"/>
               </a:ext>
             </a:extLst>
           </a:blip>
@@ -4121,7 +4121,7 @@
           <a:blip r:embed="rId10">
             <a:extLst>
               <a:ext uri="{96DAC541-7B7A-43D3-8B79-37D633B846F1}">
-                <asvg:svgBlip xmlns="" xmlns:asvg="http://schemas.microsoft.com/office/drawing/2016/SVG/main" r:embed="rId11"/>
+                <asvg:svgBlip xmlns:asvg="http://schemas.microsoft.com/office/drawing/2016/SVG/main" xmlns="" r:embed="rId11"/>
               </a:ext>
             </a:extLst>
           </a:blip>
@@ -4157,7 +4157,7 @@
           <a:blip r:embed="rId12">
             <a:extLst>
               <a:ext uri="{96DAC541-7B7A-43D3-8B79-37D633B846F1}">
-                <asvg:svgBlip xmlns="" xmlns:asvg="http://schemas.microsoft.com/office/drawing/2016/SVG/main" r:embed="rId13"/>
+                <asvg:svgBlip xmlns:asvg="http://schemas.microsoft.com/office/drawing/2016/SVG/main" xmlns="" r:embed="rId13"/>
               </a:ext>
             </a:extLst>
           </a:blip>
@@ -4295,7 +4295,7 @@
                 </a14:imgProps>
               </a:ext>
               <a:ext uri="{96DAC541-7B7A-43D3-8B79-37D633B846F1}">
-                <asvg:svgBlip xmlns="" xmlns:asvg="http://schemas.microsoft.com/office/drawing/2016/SVG/main" r:embed="rId32"/>
+                <asvg:svgBlip xmlns:asvg="http://schemas.microsoft.com/office/drawing/2016/SVG/main" xmlns="" r:embed="rId32"/>
               </a:ext>
             </a:extLst>
           </a:blip>
@@ -4679,8 +4679,25 @@
                 <a:latin typeface="Arial" panose="020B0604020202020204" pitchFamily="34" charset="0"/>
                 <a:cs typeface="Arial" panose="020B0604020202020204" pitchFamily="34" charset="0"/>
               </a:rPr>
-              <a:t>Availability Zone 1</a:t>
-            </a:r>
+              <a:t>Availability Zone </a:t>
+            </a:r>
+            <a:r>
+              <a:rPr lang="en-US" sz="1200" dirty="0" smtClean="0">
+                <a:solidFill>
+                  <a:srgbClr val="5B9CD5"/>
+                </a:solidFill>
+                <a:latin typeface="Arial" panose="020B0604020202020204" pitchFamily="34" charset="0"/>
+                <a:cs typeface="Arial" panose="020B0604020202020204" pitchFamily="34" charset="0"/>
+              </a:rPr>
+              <a:t>2</a:t>
+            </a:r>
+            <a:endParaRPr lang="en-US" sz="1200" dirty="0">
+              <a:solidFill>
+                <a:srgbClr val="5B9CD5"/>
+              </a:solidFill>
+              <a:latin typeface="Arial" panose="020B0604020202020204" pitchFamily="34" charset="0"/>
+              <a:cs typeface="Arial" panose="020B0604020202020204" pitchFamily="34" charset="0"/>
+            </a:endParaRPr>
           </a:p>
         </p:txBody>
       </p:sp>

</xml_diff>